<commit_message>
minor update to Matlab pptx
</commit_message>
<xml_diff>
--- a/Week1/NRSC 7657 Brief Matlab Overview.pptx
+++ b/Week1/NRSC 7657 Brief Matlab Overview.pptx
@@ -263,7 +263,7 @@
           <a:p>
             <a:fld id="{9D9A35FA-CCDF-4DC3-878D-D1CC9EF61817}" type="datetimeFigureOut">
               <a:rPr lang="en-US" smtClean="0"/>
-              <a:t>6/11/2021</a:t>
+              <a:t>6/12/2022</a:t>
             </a:fld>
             <a:endParaRPr lang="en-US"/>
           </a:p>
@@ -461,7 +461,7 @@
           <a:p>
             <a:fld id="{9D9A35FA-CCDF-4DC3-878D-D1CC9EF61817}" type="datetimeFigureOut">
               <a:rPr lang="en-US" smtClean="0"/>
-              <a:t>6/11/2021</a:t>
+              <a:t>6/12/2022</a:t>
             </a:fld>
             <a:endParaRPr lang="en-US"/>
           </a:p>
@@ -669,7 +669,7 @@
           <a:p>
             <a:fld id="{9D9A35FA-CCDF-4DC3-878D-D1CC9EF61817}" type="datetimeFigureOut">
               <a:rPr lang="en-US" smtClean="0"/>
-              <a:t>6/11/2021</a:t>
+              <a:t>6/12/2022</a:t>
             </a:fld>
             <a:endParaRPr lang="en-US"/>
           </a:p>
@@ -867,7 +867,7 @@
           <a:p>
             <a:fld id="{9D9A35FA-CCDF-4DC3-878D-D1CC9EF61817}" type="datetimeFigureOut">
               <a:rPr lang="en-US" smtClean="0"/>
-              <a:t>6/11/2021</a:t>
+              <a:t>6/12/2022</a:t>
             </a:fld>
             <a:endParaRPr lang="en-US"/>
           </a:p>
@@ -1142,7 +1142,7 @@
           <a:p>
             <a:fld id="{9D9A35FA-CCDF-4DC3-878D-D1CC9EF61817}" type="datetimeFigureOut">
               <a:rPr lang="en-US" smtClean="0"/>
-              <a:t>6/11/2021</a:t>
+              <a:t>6/12/2022</a:t>
             </a:fld>
             <a:endParaRPr lang="en-US"/>
           </a:p>
@@ -1407,7 +1407,7 @@
           <a:p>
             <a:fld id="{9D9A35FA-CCDF-4DC3-878D-D1CC9EF61817}" type="datetimeFigureOut">
               <a:rPr lang="en-US" smtClean="0"/>
-              <a:t>6/11/2021</a:t>
+              <a:t>6/12/2022</a:t>
             </a:fld>
             <a:endParaRPr lang="en-US"/>
           </a:p>
@@ -1819,7 +1819,7 @@
           <a:p>
             <a:fld id="{9D9A35FA-CCDF-4DC3-878D-D1CC9EF61817}" type="datetimeFigureOut">
               <a:rPr lang="en-US" smtClean="0"/>
-              <a:t>6/11/2021</a:t>
+              <a:t>6/12/2022</a:t>
             </a:fld>
             <a:endParaRPr lang="en-US"/>
           </a:p>
@@ -1960,7 +1960,7 @@
           <a:p>
             <a:fld id="{9D9A35FA-CCDF-4DC3-878D-D1CC9EF61817}" type="datetimeFigureOut">
               <a:rPr lang="en-US" smtClean="0"/>
-              <a:t>6/11/2021</a:t>
+              <a:t>6/12/2022</a:t>
             </a:fld>
             <a:endParaRPr lang="en-US"/>
           </a:p>
@@ -2073,7 +2073,7 @@
           <a:p>
             <a:fld id="{9D9A35FA-CCDF-4DC3-878D-D1CC9EF61817}" type="datetimeFigureOut">
               <a:rPr lang="en-US" smtClean="0"/>
-              <a:t>6/11/2021</a:t>
+              <a:t>6/12/2022</a:t>
             </a:fld>
             <a:endParaRPr lang="en-US"/>
           </a:p>
@@ -2384,7 +2384,7 @@
           <a:p>
             <a:fld id="{9D9A35FA-CCDF-4DC3-878D-D1CC9EF61817}" type="datetimeFigureOut">
               <a:rPr lang="en-US" smtClean="0"/>
-              <a:t>6/11/2021</a:t>
+              <a:t>6/12/2022</a:t>
             </a:fld>
             <a:endParaRPr lang="en-US"/>
           </a:p>
@@ -2672,7 +2672,7 @@
           <a:p>
             <a:fld id="{9D9A35FA-CCDF-4DC3-878D-D1CC9EF61817}" type="datetimeFigureOut">
               <a:rPr lang="en-US" smtClean="0"/>
-              <a:t>6/11/2021</a:t>
+              <a:t>6/12/2022</a:t>
             </a:fld>
             <a:endParaRPr lang="en-US"/>
           </a:p>
@@ -2913,7 +2913,7 @@
           <a:p>
             <a:fld id="{9D9A35FA-CCDF-4DC3-878D-D1CC9EF61817}" type="datetimeFigureOut">
               <a:rPr lang="en-US" smtClean="0"/>
-              <a:t>6/11/2021</a:t>
+              <a:t>6/12/2022</a:t>
             </a:fld>
             <a:endParaRPr lang="en-US"/>
           </a:p>
@@ -5457,9 +5457,18 @@
           </a:p>
           <a:p>
             <a:r>
-              <a:rPr lang="en-US" sz="2000" dirty="0"/>
-              <a:t>~</a:t>
-            </a:r>
+              <a:rPr lang="en-US" sz="2000" dirty="0" err="1">
+                <a:solidFill>
+                  <a:srgbClr val="FF0000"/>
+                </a:solidFill>
+              </a:rPr>
+              <a:t>DataFrame</a:t>
+            </a:r>
+            <a:endParaRPr lang="en-US" sz="2000" dirty="0">
+              <a:solidFill>
+                <a:srgbClr val="FF0000"/>
+              </a:solidFill>
+            </a:endParaRPr>
           </a:p>
           <a:p>
             <a:endParaRPr lang="en-US" sz="2000" dirty="0"/>

</xml_diff>